<commit_message>
update code buoi 7
</commit_message>
<xml_diff>
--- a/slide/Bootstrap.pptx
+++ b/slide/Bootstrap.pptx
@@ -21,6 +21,17 @@
     <p:sldId id="264" r:id="rId15"/>
     <p:sldId id="265" r:id="rId16"/>
     <p:sldId id="266" r:id="rId17"/>
+    <p:sldId id="273" r:id="rId18"/>
+    <p:sldId id="274" r:id="rId19"/>
+    <p:sldId id="275" r:id="rId20"/>
+    <p:sldId id="276" r:id="rId21"/>
+    <p:sldId id="277" r:id="rId22"/>
+    <p:sldId id="278" r:id="rId23"/>
+    <p:sldId id="279" r:id="rId24"/>
+    <p:sldId id="280" r:id="rId25"/>
+    <p:sldId id="281" r:id="rId26"/>
+    <p:sldId id="282" r:id="rId27"/>
+    <p:sldId id="283" r:id="rId28"/>
   </p:sldIdLst>
   <p:sldSz cx="12192000" cy="6858000"/>
   <p:notesSz cx="6858000" cy="9144000"/>
@@ -258,7 +269,7 @@
           <a:p>
             <a:fld id="{F3774DA4-A471-4011-B8A4-CC088FC0C280}" type="datetimeFigureOut">
               <a:rPr lang="en-US" smtClean="0"/>
-              <a:t>10/8/2019</a:t>
+              <a:t>10/12/2019</a:t>
             </a:fld>
             <a:endParaRPr lang="en-US"/>
           </a:p>
@@ -428,7 +439,7 @@
           <a:p>
             <a:fld id="{F3774DA4-A471-4011-B8A4-CC088FC0C280}" type="datetimeFigureOut">
               <a:rPr lang="en-US" smtClean="0"/>
-              <a:t>10/8/2019</a:t>
+              <a:t>10/12/2019</a:t>
             </a:fld>
             <a:endParaRPr lang="en-US"/>
           </a:p>
@@ -608,7 +619,7 @@
           <a:p>
             <a:fld id="{F3774DA4-A471-4011-B8A4-CC088FC0C280}" type="datetimeFigureOut">
               <a:rPr lang="en-US" smtClean="0"/>
-              <a:t>10/8/2019</a:t>
+              <a:t>10/12/2019</a:t>
             </a:fld>
             <a:endParaRPr lang="en-US"/>
           </a:p>
@@ -778,7 +789,7 @@
           <a:p>
             <a:fld id="{F3774DA4-A471-4011-B8A4-CC088FC0C280}" type="datetimeFigureOut">
               <a:rPr lang="en-US" smtClean="0"/>
-              <a:t>10/8/2019</a:t>
+              <a:t>10/12/2019</a:t>
             </a:fld>
             <a:endParaRPr lang="en-US"/>
           </a:p>
@@ -1024,7 +1035,7 @@
           <a:p>
             <a:fld id="{F3774DA4-A471-4011-B8A4-CC088FC0C280}" type="datetimeFigureOut">
               <a:rPr lang="en-US" smtClean="0"/>
-              <a:t>10/8/2019</a:t>
+              <a:t>10/12/2019</a:t>
             </a:fld>
             <a:endParaRPr lang="en-US"/>
           </a:p>
@@ -1256,7 +1267,7 @@
           <a:p>
             <a:fld id="{F3774DA4-A471-4011-B8A4-CC088FC0C280}" type="datetimeFigureOut">
               <a:rPr lang="en-US" smtClean="0"/>
-              <a:t>10/8/2019</a:t>
+              <a:t>10/12/2019</a:t>
             </a:fld>
             <a:endParaRPr lang="en-US"/>
           </a:p>
@@ -1623,7 +1634,7 @@
           <a:p>
             <a:fld id="{F3774DA4-A471-4011-B8A4-CC088FC0C280}" type="datetimeFigureOut">
               <a:rPr lang="en-US" smtClean="0"/>
-              <a:t>10/8/2019</a:t>
+              <a:t>10/12/2019</a:t>
             </a:fld>
             <a:endParaRPr lang="en-US"/>
           </a:p>
@@ -1741,7 +1752,7 @@
           <a:p>
             <a:fld id="{F3774DA4-A471-4011-B8A4-CC088FC0C280}" type="datetimeFigureOut">
               <a:rPr lang="en-US" smtClean="0"/>
-              <a:t>10/8/2019</a:t>
+              <a:t>10/12/2019</a:t>
             </a:fld>
             <a:endParaRPr lang="en-US"/>
           </a:p>
@@ -1836,7 +1847,7 @@
           <a:p>
             <a:fld id="{F3774DA4-A471-4011-B8A4-CC088FC0C280}" type="datetimeFigureOut">
               <a:rPr lang="en-US" smtClean="0"/>
-              <a:t>10/8/2019</a:t>
+              <a:t>10/12/2019</a:t>
             </a:fld>
             <a:endParaRPr lang="en-US"/>
           </a:p>
@@ -2113,7 +2124,7 @@
           <a:p>
             <a:fld id="{F3774DA4-A471-4011-B8A4-CC088FC0C280}" type="datetimeFigureOut">
               <a:rPr lang="en-US" smtClean="0"/>
-              <a:t>10/8/2019</a:t>
+              <a:t>10/12/2019</a:t>
             </a:fld>
             <a:endParaRPr lang="en-US"/>
           </a:p>
@@ -2366,7 +2377,7 @@
           <a:p>
             <a:fld id="{F3774DA4-A471-4011-B8A4-CC088FC0C280}" type="datetimeFigureOut">
               <a:rPr lang="en-US" smtClean="0"/>
-              <a:t>10/8/2019</a:t>
+              <a:t>10/12/2019</a:t>
             </a:fld>
             <a:endParaRPr lang="en-US"/>
           </a:p>
@@ -2579,7 +2590,7 @@
           <a:p>
             <a:fld id="{F3774DA4-A471-4011-B8A4-CC088FC0C280}" type="datetimeFigureOut">
               <a:rPr lang="en-US" smtClean="0"/>
-              <a:t>10/8/2019</a:t>
+              <a:t>10/12/2019</a:t>
             </a:fld>
             <a:endParaRPr lang="en-US"/>
           </a:p>
@@ -4003,6 +4014,18 @@
           <a:bodyPr/>
           <a:lstStyle/>
           <a:p>
+            <a:r>
+              <a:rPr lang="en-US" dirty="0" smtClean="0"/>
+              <a:t>Display Flex </a:t>
+            </a:r>
+            <a:r>
+              <a:rPr lang="en-US" dirty="0" err="1" smtClean="0"/>
+              <a:t>trong</a:t>
+            </a:r>
+            <a:r>
+              <a:rPr lang="en-US" dirty="0" smtClean="0"/>
+              <a:t> bootstrap	4</a:t>
+            </a:r>
             <a:endParaRPr lang="en-US" dirty="0"/>
           </a:p>
         </p:txBody>
@@ -4019,10 +4042,31 @@
         </p:nvSpPr>
         <p:spPr/>
         <p:txBody>
-          <a:bodyPr/>
-          <a:lstStyle/>
-          <a:p>
-            <a:endParaRPr lang="en-US" dirty="0"/>
+          <a:bodyPr>
+            <a:normAutofit/>
+          </a:bodyPr>
+          <a:lstStyle/>
+          <a:p>
+            <a:r>
+              <a:rPr lang="vi-VN" dirty="0"/>
+              <a:t>Trước đây khi chúng ta thiết kế web đặc biệt là dàn trang layout, menu, chia các cột cho các thành phần trong web thì hầu hết đều sử dụng các thuộc tính như float kèm theo đó là clear float để chia cột . Khó khăn là khi responsive và hiển thị trên nhiều thiết bị phải chỉnh sửa code khá nhiều nên rất tốn thời gian</a:t>
+            </a:r>
+            <a:r>
+              <a:rPr lang="vi-VN" dirty="0" smtClean="0"/>
+              <a:t>.</a:t>
+            </a:r>
+            <a:endParaRPr lang="en-US" dirty="0" smtClean="0"/>
+          </a:p>
+          <a:p>
+            <a:r>
+              <a:rPr lang="vi-VN" dirty="0"/>
+              <a:t>Hoặc nhanh hơn thì các bạn sử dụng CSS Framework như bootstrap chẳng hạn, nhưng như thế thì website của bạn lại có nhiều đoạn code ‘dư thừa’ bạn không sử dụng gây ảnh hưởng đến tốc độ website</a:t>
+            </a:r>
+            <a:r>
+              <a:rPr lang="vi-VN" dirty="0" smtClean="0"/>
+              <a:t>…</a:t>
+            </a:r>
+            <a:endParaRPr lang="en-US" dirty="0" smtClean="0"/>
           </a:p>
         </p:txBody>
       </p:sp>
@@ -4030,6 +4074,402 @@
     <p:extLst>
       <p:ext uri="{BB962C8B-B14F-4D97-AF65-F5344CB8AC3E}">
         <p14:creationId xmlns:p14="http://schemas.microsoft.com/office/powerpoint/2010/main" val="1273858653"/>
+      </p:ext>
+    </p:extLst>
+  </p:cSld>
+  <p:clrMapOvr>
+    <a:masterClrMapping/>
+  </p:clrMapOvr>
+</p:sld>
+</file>
+
+<file path=ppt/slides/slide17.xml><?xml version="1.0" encoding="utf-8"?>
+<p:sld xmlns:a="http://schemas.openxmlformats.org/drawingml/2006/main" xmlns:r="http://schemas.openxmlformats.org/officeDocument/2006/relationships" xmlns:p="http://schemas.openxmlformats.org/presentationml/2006/main">
+  <p:cSld>
+    <p:spTree>
+      <p:nvGrpSpPr>
+        <p:cNvPr id="1" name=""/>
+        <p:cNvGrpSpPr/>
+        <p:nvPr/>
+      </p:nvGrpSpPr>
+      <p:grpSpPr>
+        <a:xfrm>
+          <a:off x="0" y="0"/>
+          <a:ext cx="0" cy="0"/>
+          <a:chOff x="0" y="0"/>
+          <a:chExt cx="0" cy="0"/>
+        </a:xfrm>
+      </p:grpSpPr>
+      <p:sp>
+        <p:nvSpPr>
+          <p:cNvPr id="2" name="Title 1"/>
+          <p:cNvSpPr>
+            <a:spLocks noGrp="1"/>
+          </p:cNvSpPr>
+          <p:nvPr>
+            <p:ph type="title"/>
+          </p:nvPr>
+        </p:nvSpPr>
+        <p:spPr/>
+        <p:txBody>
+          <a:bodyPr/>
+          <a:lstStyle/>
+          <a:p>
+            <a:endParaRPr lang="en-US"/>
+          </a:p>
+        </p:txBody>
+      </p:sp>
+      <p:sp>
+        <p:nvSpPr>
+          <p:cNvPr id="3" name="Content Placeholder 2"/>
+          <p:cNvSpPr>
+            <a:spLocks noGrp="1"/>
+          </p:cNvSpPr>
+          <p:nvPr>
+            <p:ph idx="1"/>
+          </p:nvPr>
+        </p:nvSpPr>
+        <p:spPr/>
+        <p:txBody>
+          <a:bodyPr/>
+          <a:lstStyle/>
+          <a:p>
+            <a:r>
+              <a:rPr lang="vi-VN" dirty="0"/>
+              <a:t>Flexbox là một kiểu dàn trang (layout mode) mà nó sẽ tự cân đối kích thước của các phần tử bên trong để hiển thị trên mọi thiết bị. </a:t>
+            </a:r>
+            <a:endParaRPr lang="en-US" dirty="0"/>
+          </a:p>
+          <a:p>
+            <a:r>
+              <a:rPr lang="en-US" dirty="0"/>
+              <a:t>Ta </a:t>
+            </a:r>
+            <a:r>
+              <a:rPr lang="vi-VN" dirty="0"/>
+              <a:t>không cần thiết lập kích thước của phần tử, không cần cho nó float, chỉ cần thiết lập nó hiển thị chiều ngang hay chiều dọc, lúc đó các phần tử bên trong có thể hiển thị theo ý muốn.</a:t>
+            </a:r>
+            <a:endParaRPr lang="en-US" dirty="0"/>
+          </a:p>
+          <a:p>
+            <a:endParaRPr lang="en-US" dirty="0"/>
+          </a:p>
+        </p:txBody>
+      </p:sp>
+    </p:spTree>
+    <p:extLst>
+      <p:ext uri="{BB962C8B-B14F-4D97-AF65-F5344CB8AC3E}">
+        <p14:creationId xmlns:p14="http://schemas.microsoft.com/office/powerpoint/2010/main" val="552580991"/>
+      </p:ext>
+    </p:extLst>
+  </p:cSld>
+  <p:clrMapOvr>
+    <a:masterClrMapping/>
+  </p:clrMapOvr>
+</p:sld>
+</file>
+
+<file path=ppt/slides/slide18.xml><?xml version="1.0" encoding="utf-8"?>
+<p:sld xmlns:a="http://schemas.openxmlformats.org/drawingml/2006/main" xmlns:r="http://schemas.openxmlformats.org/officeDocument/2006/relationships" xmlns:p="http://schemas.openxmlformats.org/presentationml/2006/main">
+  <p:cSld>
+    <p:spTree>
+      <p:nvGrpSpPr>
+        <p:cNvPr id="1" name=""/>
+        <p:cNvGrpSpPr/>
+        <p:nvPr/>
+      </p:nvGrpSpPr>
+      <p:grpSpPr>
+        <a:xfrm>
+          <a:off x="0" y="0"/>
+          <a:ext cx="0" cy="0"/>
+          <a:chOff x="0" y="0"/>
+          <a:chExt cx="0" cy="0"/>
+        </a:xfrm>
+      </p:grpSpPr>
+      <p:sp>
+        <p:nvSpPr>
+          <p:cNvPr id="2" name="Title 1"/>
+          <p:cNvSpPr>
+            <a:spLocks noGrp="1"/>
+          </p:cNvSpPr>
+          <p:nvPr>
+            <p:ph type="title"/>
+          </p:nvPr>
+        </p:nvSpPr>
+        <p:spPr/>
+        <p:txBody>
+          <a:bodyPr/>
+          <a:lstStyle/>
+          <a:p>
+            <a:r>
+              <a:rPr lang="en-US" b="1" dirty="0" err="1"/>
+              <a:t>Thuộc</a:t>
+            </a:r>
+            <a:r>
+              <a:rPr lang="en-US" b="1" dirty="0"/>
+              <a:t> </a:t>
+            </a:r>
+            <a:r>
+              <a:rPr lang="en-US" b="1" dirty="0" err="1"/>
+              <a:t>tính</a:t>
+            </a:r>
+            <a:r>
+              <a:rPr lang="en-US" b="1" dirty="0"/>
+              <a:t> Display: Flex</a:t>
+            </a:r>
+            <a:br>
+              <a:rPr lang="en-US" b="1" dirty="0"/>
+            </a:br>
+            <a:endParaRPr lang="en-US" dirty="0"/>
+          </a:p>
+        </p:txBody>
+      </p:sp>
+      <p:sp>
+        <p:nvSpPr>
+          <p:cNvPr id="3" name="Content Placeholder 2"/>
+          <p:cNvSpPr>
+            <a:spLocks noGrp="1"/>
+          </p:cNvSpPr>
+          <p:nvPr>
+            <p:ph idx="1"/>
+          </p:nvPr>
+        </p:nvSpPr>
+        <p:spPr/>
+        <p:txBody>
+          <a:bodyPr>
+            <a:normAutofit lnSpcReduction="10000"/>
+          </a:bodyPr>
+          <a:lstStyle/>
+          <a:p>
+            <a:r>
+              <a:rPr lang="vi-VN" dirty="0"/>
+              <a:t>Để sử dụng flex trong css thì đơn giản là chúng ta chỉ cần sử dụng thuộc tính display</a:t>
+            </a:r>
+            <a:r>
+              <a:rPr lang="vi-VN" dirty="0" smtClean="0"/>
+              <a:t>: flex</a:t>
+            </a:r>
+            <a:endParaRPr lang="en-US" dirty="0" smtClean="0"/>
+          </a:p>
+          <a:p>
+            <a:r>
+              <a:rPr lang="vi-VN" dirty="0"/>
+              <a:t>Hai thành phần quan trọng nhất trong một bố cục Flexbox là gồm container và item:</a:t>
+            </a:r>
+          </a:p>
+          <a:p>
+            <a:r>
+              <a:rPr lang="vi-VN" b="1" dirty="0"/>
+              <a:t>container</a:t>
+            </a:r>
+            <a:r>
+              <a:rPr lang="vi-VN" dirty="0"/>
+              <a:t>: là thành phần lớn bao quanh các phần tử bên trong, bạn sẽ thiết lập kiểu hiển thị inline (sắp xếp theo chiều ngang) hoặc kiểu sắp xếp theo chiều dọc. Khi đó, các item bên trong sẽ hiển thị dựa trên thiết lập của container này.</a:t>
+            </a:r>
+          </a:p>
+          <a:p>
+            <a:r>
+              <a:rPr lang="vi-VN" b="1" dirty="0"/>
+              <a:t>item</a:t>
+            </a:r>
+            <a:r>
+              <a:rPr lang="vi-VN" dirty="0"/>
+              <a:t>: Các phần tử con của container được gọi là item, ở item bạn có thể thiết lập nó sẽ sử dụng bao nhiêu cột trong một container, hoặc thiết lập thứ tự hiển thị của nó.</a:t>
+            </a:r>
+          </a:p>
+          <a:p>
+            <a:endParaRPr lang="en-US" dirty="0"/>
+          </a:p>
+        </p:txBody>
+      </p:sp>
+    </p:spTree>
+    <p:extLst>
+      <p:ext uri="{BB962C8B-B14F-4D97-AF65-F5344CB8AC3E}">
+        <p14:creationId xmlns:p14="http://schemas.microsoft.com/office/powerpoint/2010/main" val="3266130743"/>
+      </p:ext>
+    </p:extLst>
+  </p:cSld>
+  <p:clrMapOvr>
+    <a:masterClrMapping/>
+  </p:clrMapOvr>
+</p:sld>
+</file>
+
+<file path=ppt/slides/slide19.xml><?xml version="1.0" encoding="utf-8"?>
+<p:sld xmlns:a="http://schemas.openxmlformats.org/drawingml/2006/main" xmlns:r="http://schemas.openxmlformats.org/officeDocument/2006/relationships" xmlns:p="http://schemas.openxmlformats.org/presentationml/2006/main">
+  <p:cSld>
+    <p:spTree>
+      <p:nvGrpSpPr>
+        <p:cNvPr id="1" name=""/>
+        <p:cNvGrpSpPr/>
+        <p:nvPr/>
+      </p:nvGrpSpPr>
+      <p:grpSpPr>
+        <a:xfrm>
+          <a:off x="0" y="0"/>
+          <a:ext cx="0" cy="0"/>
+          <a:chOff x="0" y="0"/>
+          <a:chExt cx="0" cy="0"/>
+        </a:xfrm>
+      </p:grpSpPr>
+      <p:sp>
+        <p:nvSpPr>
+          <p:cNvPr id="2" name="Title 1"/>
+          <p:cNvSpPr>
+            <a:spLocks noGrp="1"/>
+          </p:cNvSpPr>
+          <p:nvPr>
+            <p:ph type="title"/>
+          </p:nvPr>
+        </p:nvSpPr>
+        <p:spPr/>
+        <p:txBody>
+          <a:bodyPr/>
+          <a:lstStyle/>
+          <a:p>
+            <a:r>
+              <a:rPr lang="en-US" b="1" dirty="0"/>
+              <a:t># Flex-direction</a:t>
+            </a:r>
+            <a:br>
+              <a:rPr lang="en-US" b="1" dirty="0"/>
+            </a:br>
+            <a:endParaRPr lang="en-US" dirty="0"/>
+          </a:p>
+        </p:txBody>
+      </p:sp>
+      <p:sp>
+        <p:nvSpPr>
+          <p:cNvPr id="3" name="Content Placeholder 2"/>
+          <p:cNvSpPr>
+            <a:spLocks noGrp="1"/>
+          </p:cNvSpPr>
+          <p:nvPr>
+            <p:ph idx="1"/>
+          </p:nvPr>
+        </p:nvSpPr>
+        <p:spPr/>
+        <p:txBody>
+          <a:bodyPr/>
+          <a:lstStyle/>
+          <a:p>
+            <a:r>
+              <a:rPr lang="en-US" dirty="0"/>
+              <a:t>flexbox có 2 </a:t>
+            </a:r>
+            <a:r>
+              <a:rPr lang="en-US" dirty="0" err="1"/>
+              <a:t>trục</a:t>
+            </a:r>
+            <a:r>
+              <a:rPr lang="en-US" dirty="0"/>
+              <a:t> </a:t>
+            </a:r>
+            <a:r>
+              <a:rPr lang="en-US" dirty="0" err="1"/>
+              <a:t>chính</a:t>
+            </a:r>
+            <a:r>
+              <a:rPr lang="en-US" dirty="0"/>
+              <a:t> đó là </a:t>
+            </a:r>
+            <a:r>
+              <a:rPr lang="en-US" dirty="0" err="1"/>
+              <a:t>trục</a:t>
+            </a:r>
+            <a:r>
+              <a:rPr lang="en-US" dirty="0"/>
+              <a:t> X </a:t>
+            </a:r>
+            <a:r>
+              <a:rPr lang="en-US" dirty="0" err="1"/>
+              <a:t>và</a:t>
+            </a:r>
+            <a:r>
+              <a:rPr lang="en-US" dirty="0"/>
+              <a:t> </a:t>
+            </a:r>
+            <a:r>
+              <a:rPr lang="en-US" dirty="0" err="1"/>
+              <a:t>trục</a:t>
+            </a:r>
+            <a:r>
+              <a:rPr lang="en-US" dirty="0"/>
+              <a:t> </a:t>
+            </a:r>
+            <a:r>
+              <a:rPr lang="en-US" dirty="0" smtClean="0"/>
+              <a:t>Y</a:t>
+            </a:r>
+          </a:p>
+          <a:p>
+            <a:r>
+              <a:rPr lang="vi-VN" dirty="0"/>
+              <a:t>chỉ hiển thị theo 1 trong 2 </a:t>
+            </a:r>
+            <a:r>
+              <a:rPr lang="vi-VN" dirty="0" smtClean="0"/>
+              <a:t>hướng</a:t>
+            </a:r>
+            <a:endParaRPr lang="en-US" dirty="0" smtClean="0"/>
+          </a:p>
+          <a:p>
+            <a:r>
+              <a:rPr lang="en-US" dirty="0" err="1" smtClean="0"/>
+              <a:t>Mặc</a:t>
+            </a:r>
+            <a:r>
+              <a:rPr lang="en-US" dirty="0" smtClean="0"/>
+              <a:t> định </a:t>
+            </a:r>
+            <a:r>
+              <a:rPr lang="en-US" dirty="0" err="1" smtClean="0"/>
+              <a:t>theo</a:t>
+            </a:r>
+            <a:r>
+              <a:rPr lang="en-US" dirty="0" smtClean="0"/>
+              <a:t> </a:t>
+            </a:r>
+            <a:r>
+              <a:rPr lang="en-US" dirty="0" err="1" smtClean="0"/>
+              <a:t>trục</a:t>
+            </a:r>
+            <a:r>
+              <a:rPr lang="en-US" dirty="0" smtClean="0"/>
+              <a:t> x nếu không khai báo</a:t>
+            </a:r>
+            <a:endParaRPr lang="en-US" dirty="0"/>
+          </a:p>
+        </p:txBody>
+      </p:sp>
+      <p:pic>
+        <p:nvPicPr>
+          <p:cNvPr id="4" name="Picture 3"/>
+          <p:cNvPicPr>
+            <a:picLocks noChangeAspect="1"/>
+          </p:cNvPicPr>
+          <p:nvPr/>
+        </p:nvPicPr>
+        <p:blipFill>
+          <a:blip r:embed="rId2"/>
+          <a:stretch>
+            <a:fillRect/>
+          </a:stretch>
+        </p:blipFill>
+        <p:spPr>
+          <a:xfrm>
+            <a:off x="1702777" y="3657600"/>
+            <a:ext cx="7785100" cy="2888150"/>
+          </a:xfrm>
+          <a:prstGeom prst="rect">
+            <a:avLst/>
+          </a:prstGeom>
+        </p:spPr>
+      </p:pic>
+    </p:spTree>
+    <p:extLst>
+      <p:ext uri="{BB962C8B-B14F-4D97-AF65-F5344CB8AC3E}">
+        <p14:creationId xmlns:p14="http://schemas.microsoft.com/office/powerpoint/2010/main" val="2747777487"/>
       </p:ext>
     </p:extLst>
   </p:cSld>
@@ -4107,6 +4547,1638 @@
       </p:par>
     </p:tnLst>
   </p:timing>
+</p:sld>
+</file>
+
+<file path=ppt/slides/slide20.xml><?xml version="1.0" encoding="utf-8"?>
+<p:sld xmlns:a="http://schemas.openxmlformats.org/drawingml/2006/main" xmlns:r="http://schemas.openxmlformats.org/officeDocument/2006/relationships" xmlns:p="http://schemas.openxmlformats.org/presentationml/2006/main">
+  <p:cSld>
+    <p:spTree>
+      <p:nvGrpSpPr>
+        <p:cNvPr id="1" name=""/>
+        <p:cNvGrpSpPr/>
+        <p:nvPr/>
+      </p:nvGrpSpPr>
+      <p:grpSpPr>
+        <a:xfrm>
+          <a:off x="0" y="0"/>
+          <a:ext cx="0" cy="0"/>
+          <a:chOff x="0" y="0"/>
+          <a:chExt cx="0" cy="0"/>
+        </a:xfrm>
+      </p:grpSpPr>
+      <p:sp>
+        <p:nvSpPr>
+          <p:cNvPr id="2" name="Title 1"/>
+          <p:cNvSpPr>
+            <a:spLocks noGrp="1"/>
+          </p:cNvSpPr>
+          <p:nvPr>
+            <p:ph type="title"/>
+          </p:nvPr>
+        </p:nvSpPr>
+        <p:spPr/>
+        <p:txBody>
+          <a:bodyPr/>
+          <a:lstStyle/>
+          <a:p>
+            <a:endParaRPr lang="en-US"/>
+          </a:p>
+        </p:txBody>
+      </p:sp>
+      <p:sp>
+        <p:nvSpPr>
+          <p:cNvPr id="3" name="Content Placeholder 2"/>
+          <p:cNvSpPr>
+            <a:spLocks noGrp="1"/>
+          </p:cNvSpPr>
+          <p:nvPr>
+            <p:ph idx="1"/>
+          </p:nvPr>
+        </p:nvSpPr>
+        <p:spPr/>
+        <p:txBody>
+          <a:bodyPr/>
+          <a:lstStyle/>
+          <a:p>
+            <a:pPr marL="0" indent="0">
+              <a:buNone/>
+            </a:pPr>
+            <a:r>
+              <a:rPr lang="en-US" dirty="0" err="1"/>
+              <a:t>Trong</a:t>
+            </a:r>
+            <a:r>
+              <a:rPr lang="en-US" dirty="0"/>
+              <a:t> flex-direction có 4 </a:t>
+            </a:r>
+            <a:r>
+              <a:rPr lang="en-US" dirty="0" err="1"/>
+              <a:t>giá</a:t>
+            </a:r>
+            <a:r>
+              <a:rPr lang="en-US" dirty="0"/>
+              <a:t> </a:t>
+            </a:r>
+            <a:r>
+              <a:rPr lang="en-US" dirty="0" err="1"/>
+              <a:t>trị</a:t>
+            </a:r>
+            <a:r>
+              <a:rPr lang="en-US" dirty="0"/>
+              <a:t> </a:t>
+            </a:r>
+            <a:r>
+              <a:rPr lang="en-US" dirty="0" err="1"/>
+              <a:t>bao</a:t>
+            </a:r>
+            <a:r>
+              <a:rPr lang="en-US" dirty="0"/>
+              <a:t> </a:t>
+            </a:r>
+            <a:r>
+              <a:rPr lang="en-US" dirty="0" err="1"/>
+              <a:t>gồm</a:t>
+            </a:r>
+            <a:r>
+              <a:rPr lang="en-US" dirty="0"/>
+              <a:t>: </a:t>
+            </a:r>
+            <a:endParaRPr lang="en-US" dirty="0" smtClean="0"/>
+          </a:p>
+          <a:p>
+            <a:r>
+              <a:rPr lang="en-US" dirty="0" smtClean="0"/>
+              <a:t>Row</a:t>
+            </a:r>
+          </a:p>
+          <a:p>
+            <a:r>
+              <a:rPr lang="en-US" dirty="0" smtClean="0"/>
+              <a:t>Row-reverse</a:t>
+            </a:r>
+          </a:p>
+          <a:p>
+            <a:r>
+              <a:rPr lang="en-US" dirty="0" smtClean="0"/>
+              <a:t>Column</a:t>
+            </a:r>
+          </a:p>
+          <a:p>
+            <a:r>
+              <a:rPr lang="en-US" dirty="0" smtClean="0"/>
+              <a:t>Column </a:t>
+            </a:r>
+            <a:r>
+              <a:rPr lang="en-US" dirty="0"/>
+              <a:t>reverse.</a:t>
+            </a:r>
+          </a:p>
+        </p:txBody>
+      </p:sp>
+    </p:spTree>
+    <p:extLst>
+      <p:ext uri="{BB962C8B-B14F-4D97-AF65-F5344CB8AC3E}">
+        <p14:creationId xmlns:p14="http://schemas.microsoft.com/office/powerpoint/2010/main" val="2742861911"/>
+      </p:ext>
+    </p:extLst>
+  </p:cSld>
+  <p:clrMapOvr>
+    <a:masterClrMapping/>
+  </p:clrMapOvr>
+</p:sld>
+</file>
+
+<file path=ppt/slides/slide21.xml><?xml version="1.0" encoding="utf-8"?>
+<p:sld xmlns:a="http://schemas.openxmlformats.org/drawingml/2006/main" xmlns:r="http://schemas.openxmlformats.org/officeDocument/2006/relationships" xmlns:p="http://schemas.openxmlformats.org/presentationml/2006/main">
+  <p:cSld>
+    <p:spTree>
+      <p:nvGrpSpPr>
+        <p:cNvPr id="1" name=""/>
+        <p:cNvGrpSpPr/>
+        <p:nvPr/>
+      </p:nvGrpSpPr>
+      <p:grpSpPr>
+        <a:xfrm>
+          <a:off x="0" y="0"/>
+          <a:ext cx="0" cy="0"/>
+          <a:chOff x="0" y="0"/>
+          <a:chExt cx="0" cy="0"/>
+        </a:xfrm>
+      </p:grpSpPr>
+      <p:sp>
+        <p:nvSpPr>
+          <p:cNvPr id="2" name="Title 1"/>
+          <p:cNvSpPr>
+            <a:spLocks noGrp="1"/>
+          </p:cNvSpPr>
+          <p:nvPr>
+            <p:ph type="title"/>
+          </p:nvPr>
+        </p:nvSpPr>
+        <p:spPr/>
+        <p:txBody>
+          <a:bodyPr/>
+          <a:lstStyle/>
+          <a:p>
+            <a:r>
+              <a:rPr lang="en-US" b="1" dirty="0"/>
+              <a:t># Flex-wrap</a:t>
+            </a:r>
+          </a:p>
+        </p:txBody>
+      </p:sp>
+      <p:sp>
+        <p:nvSpPr>
+          <p:cNvPr id="3" name="Content Placeholder 2"/>
+          <p:cNvSpPr>
+            <a:spLocks noGrp="1"/>
+          </p:cNvSpPr>
+          <p:nvPr>
+            <p:ph idx="1"/>
+          </p:nvPr>
+        </p:nvSpPr>
+        <p:spPr/>
+        <p:txBody>
+          <a:bodyPr>
+            <a:normAutofit lnSpcReduction="10000"/>
+          </a:bodyPr>
+          <a:lstStyle/>
+          <a:p>
+            <a:r>
+              <a:rPr lang="vi-VN" dirty="0"/>
+              <a:t>Cho phép các items tự động xuống hàng hoặc vẫn luôn nằm trên cùng một hàng khi kích thước container thay </a:t>
+            </a:r>
+            <a:r>
+              <a:rPr lang="vi-VN" dirty="0" smtClean="0"/>
+              <a:t>đổi</a:t>
+            </a:r>
+            <a:r>
+              <a:rPr lang="en-US" dirty="0" smtClean="0"/>
+              <a:t>.</a:t>
+            </a:r>
+          </a:p>
+          <a:p>
+            <a:r>
+              <a:rPr lang="en-US" dirty="0" smtClean="0"/>
+              <a:t>Flex-wrap </a:t>
+            </a:r>
+            <a:r>
+              <a:rPr lang="en-US" dirty="0"/>
+              <a:t>có 3 </a:t>
+            </a:r>
+            <a:r>
+              <a:rPr lang="en-US" dirty="0" err="1"/>
+              <a:t>giá</a:t>
+            </a:r>
+            <a:r>
+              <a:rPr lang="en-US" dirty="0"/>
+              <a:t> </a:t>
+            </a:r>
+            <a:r>
+              <a:rPr lang="en-US" dirty="0" err="1"/>
+              <a:t>trị</a:t>
+            </a:r>
+            <a:r>
+              <a:rPr lang="en-US" dirty="0"/>
+              <a:t> đó là wrap, </a:t>
+            </a:r>
+            <a:r>
+              <a:rPr lang="en-US" dirty="0" err="1"/>
+              <a:t>nowrap</a:t>
+            </a:r>
+            <a:r>
+              <a:rPr lang="en-US" dirty="0"/>
+              <a:t> </a:t>
+            </a:r>
+            <a:r>
+              <a:rPr lang="en-US" dirty="0" err="1"/>
+              <a:t>và</a:t>
+            </a:r>
+            <a:r>
+              <a:rPr lang="en-US" dirty="0"/>
+              <a:t> wrap-reverse</a:t>
+            </a:r>
+            <a:r>
+              <a:rPr lang="en-US" dirty="0" smtClean="0"/>
+              <a:t>.</a:t>
+            </a:r>
+          </a:p>
+          <a:p>
+            <a:r>
+              <a:rPr lang="en-US" dirty="0" err="1" smtClean="0"/>
+              <a:t>Mặc</a:t>
+            </a:r>
+            <a:r>
+              <a:rPr lang="en-US" dirty="0" smtClean="0"/>
+              <a:t> định là no-wrap</a:t>
+            </a:r>
+          </a:p>
+          <a:p>
+            <a:r>
+              <a:rPr lang="en-US" dirty="0" smtClean="0"/>
+              <a:t>No-wrap : </a:t>
+            </a:r>
+            <a:r>
+              <a:rPr lang="en-US" dirty="0" err="1" smtClean="0"/>
+              <a:t>Khi</a:t>
+            </a:r>
+            <a:r>
+              <a:rPr lang="en-US" dirty="0" smtClean="0"/>
+              <a:t> resize </a:t>
+            </a:r>
+            <a:r>
+              <a:rPr lang="en-US" dirty="0"/>
+              <a:t>trình </a:t>
+            </a:r>
+            <a:r>
+              <a:rPr lang="en-US" dirty="0" err="1"/>
+              <a:t>duyệt</a:t>
+            </a:r>
+            <a:r>
+              <a:rPr lang="en-US" dirty="0"/>
+              <a:t> lại nếu </a:t>
+            </a:r>
+            <a:r>
+              <a:rPr lang="en-US" dirty="0" err="1"/>
+              <a:t>các</a:t>
+            </a:r>
+            <a:r>
+              <a:rPr lang="en-US" dirty="0"/>
+              <a:t> </a:t>
+            </a:r>
+            <a:r>
+              <a:rPr lang="en-US" dirty="0" err="1"/>
+              <a:t>bạn</a:t>
+            </a:r>
+            <a:r>
+              <a:rPr lang="en-US" dirty="0"/>
+              <a:t> </a:t>
+            </a:r>
+            <a:r>
+              <a:rPr lang="en-US" dirty="0" err="1"/>
+              <a:t>sử</a:t>
+            </a:r>
+            <a:r>
+              <a:rPr lang="en-US" dirty="0"/>
+              <a:t> </a:t>
+            </a:r>
+            <a:r>
+              <a:rPr lang="en-US" dirty="0" err="1"/>
+              <a:t>dụng</a:t>
+            </a:r>
+            <a:r>
+              <a:rPr lang="en-US" dirty="0"/>
+              <a:t> </a:t>
+            </a:r>
+            <a:r>
+              <a:rPr lang="en-US" dirty="0" err="1"/>
+              <a:t>thuộc</a:t>
+            </a:r>
+            <a:r>
+              <a:rPr lang="en-US" dirty="0"/>
+              <a:t> </a:t>
+            </a:r>
+            <a:r>
+              <a:rPr lang="en-US" dirty="0" err="1"/>
+              <a:t>tính</a:t>
+            </a:r>
+            <a:r>
+              <a:rPr lang="en-US" dirty="0"/>
+              <a:t> flex-wrap: </a:t>
+            </a:r>
+            <a:r>
+              <a:rPr lang="en-US" dirty="0" err="1"/>
+              <a:t>nowrap</a:t>
+            </a:r>
+            <a:r>
+              <a:rPr lang="en-US" dirty="0"/>
+              <a:t> thì </a:t>
+            </a:r>
+            <a:r>
+              <a:rPr lang="en-US" dirty="0" err="1"/>
+              <a:t>các</a:t>
+            </a:r>
+            <a:r>
+              <a:rPr lang="en-US" dirty="0"/>
+              <a:t> items sẽ </a:t>
+            </a:r>
+            <a:r>
+              <a:rPr lang="en-US" dirty="0" err="1"/>
+              <a:t>tự</a:t>
+            </a:r>
+            <a:r>
+              <a:rPr lang="en-US" dirty="0"/>
+              <a:t> động co lại </a:t>
+            </a:r>
+            <a:r>
+              <a:rPr lang="en-US" dirty="0" err="1"/>
+              <a:t>cho</a:t>
+            </a:r>
+            <a:r>
+              <a:rPr lang="en-US" dirty="0"/>
+              <a:t> </a:t>
+            </a:r>
+            <a:r>
+              <a:rPr lang="en-US" dirty="0" err="1"/>
+              <a:t>chớ</a:t>
+            </a:r>
+            <a:r>
+              <a:rPr lang="en-US" dirty="0"/>
+              <a:t> không có </a:t>
+            </a:r>
+            <a:r>
+              <a:rPr lang="en-US" dirty="0" err="1"/>
+              <a:t>rớt</a:t>
+            </a:r>
+            <a:r>
+              <a:rPr lang="en-US" dirty="0"/>
+              <a:t> xuống </a:t>
+            </a:r>
+            <a:r>
+              <a:rPr lang="en-US" dirty="0" smtClean="0"/>
+              <a:t>hàng</a:t>
+            </a:r>
+          </a:p>
+          <a:p>
+            <a:r>
+              <a:rPr lang="vi-VN" dirty="0"/>
+              <a:t>flex-wrap: </a:t>
+            </a:r>
+            <a:r>
+              <a:rPr lang="vi-VN" dirty="0" smtClean="0"/>
+              <a:t>ngược </a:t>
+            </a:r>
+            <a:r>
+              <a:rPr lang="vi-VN" dirty="0"/>
+              <a:t>lại so với </a:t>
+            </a:r>
+            <a:r>
+              <a:rPr lang="vi-VN" dirty="0" smtClean="0"/>
+              <a:t>nowrap </a:t>
+            </a:r>
+            <a:r>
+              <a:rPr lang="vi-VN" dirty="0"/>
+              <a:t>khi kích thước container thay đổi và tổng chiều rộng các items cộng lại lớn hơn chiều rộng của container bọc ngoài thì nó sẽ rớt xuống.</a:t>
+            </a:r>
+            <a:endParaRPr lang="en-US" dirty="0"/>
+          </a:p>
+        </p:txBody>
+      </p:sp>
+    </p:spTree>
+    <p:extLst>
+      <p:ext uri="{BB962C8B-B14F-4D97-AF65-F5344CB8AC3E}">
+        <p14:creationId xmlns:p14="http://schemas.microsoft.com/office/powerpoint/2010/main" val="2862536103"/>
+      </p:ext>
+    </p:extLst>
+  </p:cSld>
+  <p:clrMapOvr>
+    <a:masterClrMapping/>
+  </p:clrMapOvr>
+</p:sld>
+</file>
+
+<file path=ppt/slides/slide22.xml><?xml version="1.0" encoding="utf-8"?>
+<p:sld xmlns:a="http://schemas.openxmlformats.org/drawingml/2006/main" xmlns:r="http://schemas.openxmlformats.org/officeDocument/2006/relationships" xmlns:p="http://schemas.openxmlformats.org/presentationml/2006/main">
+  <p:cSld>
+    <p:spTree>
+      <p:nvGrpSpPr>
+        <p:cNvPr id="1" name=""/>
+        <p:cNvGrpSpPr/>
+        <p:nvPr/>
+      </p:nvGrpSpPr>
+      <p:grpSpPr>
+        <a:xfrm>
+          <a:off x="0" y="0"/>
+          <a:ext cx="0" cy="0"/>
+          <a:chOff x="0" y="0"/>
+          <a:chExt cx="0" cy="0"/>
+        </a:xfrm>
+      </p:grpSpPr>
+      <p:sp>
+        <p:nvSpPr>
+          <p:cNvPr id="2" name="Title 1"/>
+          <p:cNvSpPr>
+            <a:spLocks noGrp="1"/>
+          </p:cNvSpPr>
+          <p:nvPr>
+            <p:ph type="title"/>
+          </p:nvPr>
+        </p:nvSpPr>
+        <p:spPr/>
+        <p:txBody>
+          <a:bodyPr/>
+          <a:lstStyle/>
+          <a:p>
+            <a:r>
+              <a:rPr lang="en-US" b="1" dirty="0"/>
+              <a:t># Justify-content</a:t>
+            </a:r>
+            <a:br>
+              <a:rPr lang="en-US" b="1" dirty="0"/>
+            </a:br>
+            <a:endParaRPr lang="en-US" dirty="0"/>
+          </a:p>
+        </p:txBody>
+      </p:sp>
+      <p:sp>
+        <p:nvSpPr>
+          <p:cNvPr id="3" name="Content Placeholder 2"/>
+          <p:cNvSpPr>
+            <a:spLocks noGrp="1"/>
+          </p:cNvSpPr>
+          <p:nvPr>
+            <p:ph idx="1"/>
+          </p:nvPr>
+        </p:nvSpPr>
+        <p:spPr>
+          <a:xfrm>
+            <a:off x="838200" y="1242060"/>
+            <a:ext cx="10515600" cy="4934903"/>
+          </a:xfrm>
+        </p:spPr>
+        <p:txBody>
+          <a:bodyPr/>
+          <a:lstStyle/>
+          <a:p>
+            <a:r>
+              <a:rPr lang="vi-VN" dirty="0"/>
+              <a:t>Thuộc tính này cho phép các bạn căn chỉnh các phần tử theo chiều ngang hoặc chiều dọc tùy thuộc vào thuộc tính </a:t>
+            </a:r>
+            <a:r>
+              <a:rPr lang="vi-VN" dirty="0" smtClean="0"/>
+              <a:t>flex-direction.</a:t>
+            </a:r>
+            <a:endParaRPr lang="en-US" dirty="0" smtClean="0"/>
+          </a:p>
+          <a:p>
+            <a:r>
+              <a:rPr lang="en-US" dirty="0" smtClean="0"/>
+              <a:t>Có 5 </a:t>
+            </a:r>
+            <a:r>
+              <a:rPr lang="en-US" dirty="0" err="1" smtClean="0"/>
+              <a:t>giá</a:t>
+            </a:r>
+            <a:r>
+              <a:rPr lang="en-US" dirty="0" smtClean="0"/>
+              <a:t> </a:t>
+            </a:r>
+            <a:r>
+              <a:rPr lang="en-US" dirty="0" err="1" smtClean="0"/>
+              <a:t>trị</a:t>
+            </a:r>
+            <a:r>
+              <a:rPr lang="en-US" dirty="0"/>
+              <a:t> : flex-start, flex-end, center, space-between </a:t>
+            </a:r>
+            <a:r>
+              <a:rPr lang="en-US" dirty="0" err="1"/>
+              <a:t>và</a:t>
+            </a:r>
+            <a:r>
+              <a:rPr lang="en-US" dirty="0"/>
+              <a:t> space-around</a:t>
+            </a:r>
+            <a:r>
+              <a:rPr lang="vi-VN" dirty="0" smtClean="0"/>
+              <a:t> </a:t>
+            </a:r>
+            <a:endParaRPr lang="en-US" dirty="0"/>
+          </a:p>
+          <a:p>
+            <a:r>
+              <a:rPr lang="en-US" dirty="0"/>
+              <a:t>flex-start: </a:t>
+            </a:r>
+            <a:r>
+              <a:rPr lang="en-US" dirty="0" err="1"/>
+              <a:t>Giá</a:t>
+            </a:r>
+            <a:r>
+              <a:rPr lang="en-US" dirty="0"/>
+              <a:t> </a:t>
+            </a:r>
+            <a:r>
+              <a:rPr lang="en-US" dirty="0" err="1"/>
+              <a:t>trị</a:t>
+            </a:r>
+            <a:r>
+              <a:rPr lang="en-US" dirty="0"/>
+              <a:t> </a:t>
+            </a:r>
+            <a:r>
+              <a:rPr lang="en-US" dirty="0" err="1"/>
+              <a:t>mặc</a:t>
+            </a:r>
+            <a:r>
+              <a:rPr lang="en-US" dirty="0"/>
+              <a:t> định </a:t>
+            </a:r>
+            <a:r>
+              <a:rPr lang="en-US" dirty="0" err="1"/>
+              <a:t>trong</a:t>
+            </a:r>
+            <a:r>
+              <a:rPr lang="en-US" dirty="0"/>
+              <a:t> </a:t>
+            </a:r>
+            <a:r>
+              <a:rPr lang="en-US" dirty="0" err="1"/>
+              <a:t>thuộc</a:t>
+            </a:r>
+            <a:r>
+              <a:rPr lang="en-US" dirty="0"/>
+              <a:t> </a:t>
+            </a:r>
+            <a:r>
+              <a:rPr lang="en-US" dirty="0" err="1"/>
+              <a:t>tính</a:t>
+            </a:r>
+            <a:r>
+              <a:rPr lang="en-US" dirty="0"/>
+              <a:t> justify-content </a:t>
+            </a:r>
+            <a:r>
+              <a:rPr lang="en-US" dirty="0" err="1"/>
+              <a:t>khi</a:t>
+            </a:r>
+            <a:r>
+              <a:rPr lang="en-US" dirty="0"/>
+              <a:t> </a:t>
+            </a:r>
+            <a:r>
+              <a:rPr lang="en-US" dirty="0" err="1"/>
+              <a:t>sử</a:t>
+            </a:r>
+            <a:r>
+              <a:rPr lang="en-US" dirty="0"/>
+              <a:t> </a:t>
+            </a:r>
+            <a:r>
+              <a:rPr lang="en-US" dirty="0" err="1"/>
+              <a:t>dụng</a:t>
+            </a:r>
+            <a:r>
+              <a:rPr lang="en-US" dirty="0"/>
+              <a:t> </a:t>
+            </a:r>
+            <a:r>
+              <a:rPr lang="en-US" dirty="0" err="1"/>
+              <a:t>giá</a:t>
+            </a:r>
+            <a:r>
+              <a:rPr lang="en-US" dirty="0"/>
+              <a:t> </a:t>
+            </a:r>
+            <a:r>
+              <a:rPr lang="en-US" dirty="0" err="1"/>
+              <a:t>trị</a:t>
+            </a:r>
+            <a:r>
+              <a:rPr lang="en-US" dirty="0"/>
+              <a:t> này thì </a:t>
+            </a:r>
+            <a:r>
+              <a:rPr lang="en-US" dirty="0" err="1"/>
+              <a:t>những</a:t>
+            </a:r>
+            <a:r>
+              <a:rPr lang="en-US" dirty="0"/>
+              <a:t> phần </a:t>
+            </a:r>
+            <a:r>
+              <a:rPr lang="en-US" dirty="0" err="1"/>
+              <a:t>tử</a:t>
+            </a:r>
+            <a:r>
+              <a:rPr lang="en-US" dirty="0"/>
+              <a:t> sẽ </a:t>
+            </a:r>
+            <a:r>
+              <a:rPr lang="en-US" dirty="0" err="1"/>
+              <a:t>nằm</a:t>
+            </a:r>
+            <a:r>
+              <a:rPr lang="en-US" dirty="0"/>
+              <a:t> </a:t>
+            </a:r>
+            <a:r>
+              <a:rPr lang="en-US" dirty="0" err="1"/>
+              <a:t>sát</a:t>
+            </a:r>
+            <a:r>
+              <a:rPr lang="en-US" dirty="0"/>
+              <a:t> </a:t>
+            </a:r>
+            <a:r>
+              <a:rPr lang="en-US" dirty="0" err="1"/>
+              <a:t>lề</a:t>
+            </a:r>
+            <a:r>
+              <a:rPr lang="en-US" dirty="0"/>
+              <a:t> bên </a:t>
+            </a:r>
+            <a:r>
+              <a:rPr lang="en-US" dirty="0" err="1"/>
+              <a:t>trái</a:t>
+            </a:r>
+            <a:r>
+              <a:rPr lang="en-US" dirty="0"/>
+              <a:t> của </a:t>
+            </a:r>
+            <a:r>
+              <a:rPr lang="en-US" dirty="0" smtClean="0"/>
+              <a:t>container.</a:t>
+            </a:r>
+            <a:endParaRPr lang="en-US" dirty="0"/>
+          </a:p>
+          <a:p>
+            <a:r>
+              <a:rPr lang="en-US" dirty="0" smtClean="0"/>
+              <a:t>Flex-end : </a:t>
+            </a:r>
+            <a:r>
+              <a:rPr lang="en-US" dirty="0" err="1" smtClean="0"/>
+              <a:t>Sử</a:t>
+            </a:r>
+            <a:r>
+              <a:rPr lang="en-US" dirty="0" smtClean="0"/>
+              <a:t> </a:t>
+            </a:r>
+            <a:r>
+              <a:rPr lang="en-US" dirty="0" err="1"/>
+              <a:t>dụng</a:t>
+            </a:r>
+            <a:r>
+              <a:rPr lang="en-US" dirty="0"/>
+              <a:t> </a:t>
+            </a:r>
+            <a:r>
+              <a:rPr lang="en-US" dirty="0" err="1"/>
+              <a:t>giá</a:t>
+            </a:r>
+            <a:r>
+              <a:rPr lang="en-US" dirty="0"/>
+              <a:t> </a:t>
+            </a:r>
+            <a:r>
+              <a:rPr lang="en-US" dirty="0" err="1"/>
+              <a:t>trị</a:t>
+            </a:r>
+            <a:r>
+              <a:rPr lang="en-US" dirty="0"/>
+              <a:t> này thì </a:t>
+            </a:r>
+            <a:r>
+              <a:rPr lang="en-US" dirty="0" err="1"/>
+              <a:t>các</a:t>
+            </a:r>
+            <a:r>
+              <a:rPr lang="en-US" dirty="0"/>
+              <a:t> phần </a:t>
+            </a:r>
+            <a:r>
+              <a:rPr lang="en-US" dirty="0" err="1"/>
+              <a:t>tử</a:t>
+            </a:r>
+            <a:r>
+              <a:rPr lang="en-US" dirty="0"/>
+              <a:t> sẽ </a:t>
+            </a:r>
+            <a:r>
+              <a:rPr lang="en-US" dirty="0" err="1"/>
+              <a:t>nằm</a:t>
+            </a:r>
+            <a:r>
+              <a:rPr lang="en-US" dirty="0"/>
+              <a:t> </a:t>
+            </a:r>
+            <a:r>
+              <a:rPr lang="en-US" dirty="0" err="1"/>
+              <a:t>sát</a:t>
+            </a:r>
+            <a:r>
+              <a:rPr lang="en-US" dirty="0"/>
+              <a:t> </a:t>
+            </a:r>
+            <a:r>
+              <a:rPr lang="en-US" dirty="0" err="1"/>
+              <a:t>lề</a:t>
+            </a:r>
+            <a:r>
+              <a:rPr lang="en-US" dirty="0"/>
+              <a:t> bên </a:t>
+            </a:r>
+            <a:r>
+              <a:rPr lang="en-US" dirty="0" smtClean="0"/>
+              <a:t>phải</a:t>
+            </a:r>
+            <a:r>
+              <a:rPr lang="en-US" dirty="0"/>
+              <a:t>.</a:t>
+            </a:r>
+            <a:endParaRPr lang="en-US" dirty="0" smtClean="0"/>
+          </a:p>
+        </p:txBody>
+      </p:sp>
+    </p:spTree>
+    <p:extLst>
+      <p:ext uri="{BB962C8B-B14F-4D97-AF65-F5344CB8AC3E}">
+        <p14:creationId xmlns:p14="http://schemas.microsoft.com/office/powerpoint/2010/main" val="3002526344"/>
+      </p:ext>
+    </p:extLst>
+  </p:cSld>
+  <p:clrMapOvr>
+    <a:masterClrMapping/>
+  </p:clrMapOvr>
+</p:sld>
+</file>
+
+<file path=ppt/slides/slide23.xml><?xml version="1.0" encoding="utf-8"?>
+<p:sld xmlns:a="http://schemas.openxmlformats.org/drawingml/2006/main" xmlns:r="http://schemas.openxmlformats.org/officeDocument/2006/relationships" xmlns:p="http://schemas.openxmlformats.org/presentationml/2006/main">
+  <p:cSld>
+    <p:spTree>
+      <p:nvGrpSpPr>
+        <p:cNvPr id="1" name=""/>
+        <p:cNvGrpSpPr/>
+        <p:nvPr/>
+      </p:nvGrpSpPr>
+      <p:grpSpPr>
+        <a:xfrm>
+          <a:off x="0" y="0"/>
+          <a:ext cx="0" cy="0"/>
+          <a:chOff x="0" y="0"/>
+          <a:chExt cx="0" cy="0"/>
+        </a:xfrm>
+      </p:grpSpPr>
+      <p:sp>
+        <p:nvSpPr>
+          <p:cNvPr id="2" name="Title 1"/>
+          <p:cNvSpPr>
+            <a:spLocks noGrp="1"/>
+          </p:cNvSpPr>
+          <p:nvPr>
+            <p:ph type="title"/>
+          </p:nvPr>
+        </p:nvSpPr>
+        <p:spPr/>
+        <p:txBody>
+          <a:bodyPr/>
+          <a:lstStyle/>
+          <a:p>
+            <a:endParaRPr lang="en-US" dirty="0"/>
+          </a:p>
+        </p:txBody>
+      </p:sp>
+      <p:sp>
+        <p:nvSpPr>
+          <p:cNvPr id="3" name="Content Placeholder 2"/>
+          <p:cNvSpPr>
+            <a:spLocks noGrp="1"/>
+          </p:cNvSpPr>
+          <p:nvPr>
+            <p:ph idx="1"/>
+          </p:nvPr>
+        </p:nvSpPr>
+        <p:spPr/>
+        <p:txBody>
+          <a:bodyPr/>
+          <a:lstStyle/>
+          <a:p>
+            <a:r>
+              <a:rPr lang="en-US" dirty="0"/>
+              <a:t>center</a:t>
+            </a:r>
+            <a:r>
+              <a:rPr lang="en-US" dirty="0" smtClean="0"/>
+              <a:t>: </a:t>
+            </a:r>
+            <a:r>
+              <a:rPr lang="en-US" dirty="0" err="1"/>
+              <a:t>Giá</a:t>
+            </a:r>
+            <a:r>
+              <a:rPr lang="en-US" dirty="0"/>
+              <a:t> </a:t>
+            </a:r>
+            <a:r>
+              <a:rPr lang="en-US" dirty="0" err="1"/>
+              <a:t>trị</a:t>
+            </a:r>
+            <a:r>
+              <a:rPr lang="en-US" dirty="0"/>
+              <a:t> này làm </a:t>
+            </a:r>
+            <a:r>
+              <a:rPr lang="en-US" dirty="0" err="1"/>
+              <a:t>cho</a:t>
+            </a:r>
+            <a:r>
+              <a:rPr lang="en-US" dirty="0"/>
+              <a:t> </a:t>
+            </a:r>
+            <a:r>
+              <a:rPr lang="en-US" dirty="0" err="1"/>
+              <a:t>các</a:t>
+            </a:r>
+            <a:r>
+              <a:rPr lang="en-US" dirty="0"/>
+              <a:t> phần </a:t>
+            </a:r>
+            <a:r>
+              <a:rPr lang="en-US" dirty="0" err="1"/>
+              <a:t>tử</a:t>
+            </a:r>
+            <a:r>
+              <a:rPr lang="en-US" dirty="0"/>
+              <a:t> </a:t>
+            </a:r>
+            <a:r>
+              <a:rPr lang="en-US" dirty="0" err="1"/>
+              <a:t>nằm</a:t>
+            </a:r>
+            <a:r>
+              <a:rPr lang="en-US" dirty="0"/>
+              <a:t> </a:t>
+            </a:r>
+            <a:r>
+              <a:rPr lang="en-US" dirty="0" err="1"/>
+              <a:t>giữa</a:t>
+            </a:r>
+            <a:r>
+              <a:rPr lang="en-US" dirty="0"/>
+              <a:t> container</a:t>
+            </a:r>
+            <a:r>
+              <a:rPr lang="en-US" dirty="0" smtClean="0"/>
+              <a:t>.</a:t>
+            </a:r>
+          </a:p>
+          <a:p>
+            <a:r>
+              <a:rPr lang="en-US" dirty="0"/>
+              <a:t>space-between: </a:t>
+            </a:r>
+            <a:r>
+              <a:rPr lang="en-US" dirty="0" err="1"/>
+              <a:t>Giá</a:t>
+            </a:r>
+            <a:r>
+              <a:rPr lang="en-US" dirty="0"/>
+              <a:t> </a:t>
+            </a:r>
+            <a:r>
+              <a:rPr lang="en-US" dirty="0" err="1"/>
+              <a:t>trị</a:t>
+            </a:r>
+            <a:r>
+              <a:rPr lang="en-US" dirty="0"/>
+              <a:t> này tạo </a:t>
+            </a:r>
+            <a:r>
+              <a:rPr lang="en-US" dirty="0" err="1"/>
+              <a:t>khoảng</a:t>
+            </a:r>
+            <a:r>
+              <a:rPr lang="en-US" dirty="0"/>
+              <a:t> </a:t>
+            </a:r>
+            <a:r>
+              <a:rPr lang="en-US" dirty="0" err="1"/>
+              <a:t>cách</a:t>
+            </a:r>
+            <a:r>
+              <a:rPr lang="en-US" dirty="0"/>
+              <a:t> </a:t>
+            </a:r>
+            <a:r>
+              <a:rPr lang="en-US" dirty="0" err="1"/>
+              <a:t>giữa</a:t>
+            </a:r>
+            <a:r>
+              <a:rPr lang="en-US" dirty="0"/>
+              <a:t> </a:t>
+            </a:r>
+            <a:r>
+              <a:rPr lang="en-US" dirty="0" err="1"/>
+              <a:t>các</a:t>
+            </a:r>
+            <a:r>
+              <a:rPr lang="en-US" dirty="0"/>
+              <a:t> phần </a:t>
+            </a:r>
+            <a:r>
+              <a:rPr lang="en-US" dirty="0" err="1"/>
+              <a:t>tử</a:t>
+            </a:r>
+            <a:r>
+              <a:rPr lang="en-US" dirty="0"/>
+              <a:t> </a:t>
+            </a:r>
+            <a:r>
+              <a:rPr lang="en-US" dirty="0" err="1"/>
+              <a:t>bằng</a:t>
+            </a:r>
+            <a:r>
+              <a:rPr lang="en-US" dirty="0"/>
+              <a:t> nhau, phần </a:t>
+            </a:r>
+            <a:r>
+              <a:rPr lang="en-US" dirty="0" err="1"/>
+              <a:t>tử</a:t>
+            </a:r>
+            <a:r>
+              <a:rPr lang="en-US" dirty="0"/>
+              <a:t> đầu </a:t>
+            </a:r>
+            <a:r>
+              <a:rPr lang="en-US" dirty="0" err="1"/>
+              <a:t>tiên</a:t>
+            </a:r>
+            <a:r>
+              <a:rPr lang="en-US" dirty="0"/>
+              <a:t> </a:t>
+            </a:r>
+            <a:r>
+              <a:rPr lang="en-US" dirty="0" err="1"/>
+              <a:t>sát</a:t>
+            </a:r>
+            <a:r>
+              <a:rPr lang="en-US" dirty="0"/>
+              <a:t> </a:t>
+            </a:r>
+            <a:r>
+              <a:rPr lang="en-US" dirty="0" err="1"/>
+              <a:t>lề</a:t>
+            </a:r>
+            <a:r>
+              <a:rPr lang="en-US" dirty="0"/>
+              <a:t> bên </a:t>
+            </a:r>
+            <a:r>
+              <a:rPr lang="en-US" dirty="0" err="1"/>
+              <a:t>trái</a:t>
+            </a:r>
+            <a:r>
+              <a:rPr lang="en-US" dirty="0"/>
+              <a:t>, phần </a:t>
+            </a:r>
+            <a:r>
+              <a:rPr lang="en-US" dirty="0" err="1"/>
+              <a:t>tử</a:t>
+            </a:r>
+            <a:r>
+              <a:rPr lang="en-US" dirty="0"/>
+              <a:t> </a:t>
+            </a:r>
+            <a:r>
+              <a:rPr lang="en-US" dirty="0" err="1"/>
+              <a:t>cuối</a:t>
+            </a:r>
+            <a:r>
+              <a:rPr lang="en-US" dirty="0"/>
+              <a:t> </a:t>
+            </a:r>
+            <a:r>
+              <a:rPr lang="en-US" dirty="0" err="1"/>
+              <a:t>cùng</a:t>
+            </a:r>
+            <a:r>
+              <a:rPr lang="en-US" dirty="0"/>
+              <a:t> </a:t>
+            </a:r>
+            <a:r>
+              <a:rPr lang="en-US" dirty="0" err="1"/>
+              <a:t>sát</a:t>
+            </a:r>
+            <a:r>
+              <a:rPr lang="en-US" dirty="0"/>
+              <a:t> </a:t>
+            </a:r>
+            <a:r>
+              <a:rPr lang="en-US" dirty="0" err="1"/>
+              <a:t>lề</a:t>
+            </a:r>
+            <a:r>
+              <a:rPr lang="en-US" dirty="0"/>
+              <a:t> bên phải, container sẽ </a:t>
+            </a:r>
+            <a:r>
+              <a:rPr lang="en-US" dirty="0" err="1"/>
+              <a:t>tự</a:t>
+            </a:r>
+            <a:r>
+              <a:rPr lang="en-US" dirty="0"/>
+              <a:t> động </a:t>
+            </a:r>
+            <a:r>
+              <a:rPr lang="en-US" dirty="0" err="1"/>
+              <a:t>canh</a:t>
+            </a:r>
+            <a:r>
+              <a:rPr lang="en-US" dirty="0"/>
+              <a:t> </a:t>
+            </a:r>
+            <a:r>
+              <a:rPr lang="en-US" dirty="0" err="1"/>
+              <a:t>khoảng</a:t>
+            </a:r>
+            <a:r>
+              <a:rPr lang="en-US" dirty="0"/>
+              <a:t> </a:t>
+            </a:r>
+            <a:r>
+              <a:rPr lang="en-US" dirty="0" err="1"/>
+              <a:t>cách</a:t>
+            </a:r>
+            <a:r>
+              <a:rPr lang="en-US" dirty="0"/>
+              <a:t> </a:t>
+            </a:r>
+            <a:r>
+              <a:rPr lang="en-US" dirty="0" err="1"/>
+              <a:t>giữa</a:t>
+            </a:r>
+            <a:r>
+              <a:rPr lang="en-US" dirty="0"/>
+              <a:t> </a:t>
+            </a:r>
+            <a:r>
+              <a:rPr lang="en-US" dirty="0" err="1"/>
+              <a:t>các</a:t>
+            </a:r>
+            <a:r>
+              <a:rPr lang="en-US" dirty="0"/>
+              <a:t> phần </a:t>
+            </a:r>
+            <a:r>
+              <a:rPr lang="en-US" dirty="0" err="1"/>
+              <a:t>tử</a:t>
+            </a:r>
+            <a:r>
+              <a:rPr lang="en-US" dirty="0"/>
+              <a:t> với nhau </a:t>
+            </a:r>
+            <a:r>
+              <a:rPr lang="en-US" dirty="0" err="1"/>
+              <a:t>sao</a:t>
+            </a:r>
+            <a:r>
+              <a:rPr lang="en-US" dirty="0"/>
+              <a:t> </a:t>
+            </a:r>
+            <a:r>
+              <a:rPr lang="en-US" dirty="0" err="1"/>
+              <a:t>cho</a:t>
+            </a:r>
+            <a:r>
+              <a:rPr lang="en-US" dirty="0"/>
+              <a:t> luôn </a:t>
+            </a:r>
+            <a:r>
+              <a:rPr lang="en-US" dirty="0" err="1"/>
+              <a:t>bằng</a:t>
+            </a:r>
+            <a:r>
+              <a:rPr lang="en-US" dirty="0"/>
+              <a:t> nhau</a:t>
+            </a:r>
+            <a:r>
+              <a:rPr lang="en-US" dirty="0" smtClean="0"/>
+              <a:t>.</a:t>
+            </a:r>
+          </a:p>
+          <a:p>
+            <a:r>
+              <a:rPr lang="vi-VN" dirty="0"/>
+              <a:t>space-around: Giá trị này thì na ná space-between nhưng khác ở chỗ là có khoảng cách 2 bên giữa các phần tử và những khoảng cách này bằng nhau.</a:t>
+            </a:r>
+            <a:endParaRPr lang="en-US" dirty="0"/>
+          </a:p>
+        </p:txBody>
+      </p:sp>
+    </p:spTree>
+    <p:extLst>
+      <p:ext uri="{BB962C8B-B14F-4D97-AF65-F5344CB8AC3E}">
+        <p14:creationId xmlns:p14="http://schemas.microsoft.com/office/powerpoint/2010/main" val="3039535960"/>
+      </p:ext>
+    </p:extLst>
+  </p:cSld>
+  <p:clrMapOvr>
+    <a:masterClrMapping/>
+  </p:clrMapOvr>
+</p:sld>
+</file>
+
+<file path=ppt/slides/slide24.xml><?xml version="1.0" encoding="utf-8"?>
+<p:sld xmlns:a="http://schemas.openxmlformats.org/drawingml/2006/main" xmlns:r="http://schemas.openxmlformats.org/officeDocument/2006/relationships" xmlns:p="http://schemas.openxmlformats.org/presentationml/2006/main">
+  <p:cSld>
+    <p:spTree>
+      <p:nvGrpSpPr>
+        <p:cNvPr id="1" name=""/>
+        <p:cNvGrpSpPr/>
+        <p:nvPr/>
+      </p:nvGrpSpPr>
+      <p:grpSpPr>
+        <a:xfrm>
+          <a:off x="0" y="0"/>
+          <a:ext cx="0" cy="0"/>
+          <a:chOff x="0" y="0"/>
+          <a:chExt cx="0" cy="0"/>
+        </a:xfrm>
+      </p:grpSpPr>
+      <p:sp>
+        <p:nvSpPr>
+          <p:cNvPr id="2" name="Title 1"/>
+          <p:cNvSpPr>
+            <a:spLocks noGrp="1"/>
+          </p:cNvSpPr>
+          <p:nvPr>
+            <p:ph type="title"/>
+          </p:nvPr>
+        </p:nvSpPr>
+        <p:spPr/>
+        <p:txBody>
+          <a:bodyPr/>
+          <a:lstStyle/>
+          <a:p>
+            <a:r>
+              <a:rPr lang="en-US" b="1" dirty="0" smtClean="0"/>
+              <a:t># Align-items</a:t>
+            </a:r>
+            <a:endParaRPr lang="en-US" b="1" dirty="0"/>
+          </a:p>
+        </p:txBody>
+      </p:sp>
+      <p:sp>
+        <p:nvSpPr>
+          <p:cNvPr id="3" name="Content Placeholder 2"/>
+          <p:cNvSpPr>
+            <a:spLocks noGrp="1"/>
+          </p:cNvSpPr>
+          <p:nvPr>
+            <p:ph idx="1"/>
+          </p:nvPr>
+        </p:nvSpPr>
+        <p:spPr/>
+        <p:txBody>
+          <a:bodyPr/>
+          <a:lstStyle/>
+          <a:p>
+            <a:r>
+              <a:rPr lang="vi-VN" dirty="0"/>
+              <a:t>Ngược lại với thuộc tính justify-content thì mặc định align-items canh các phần tử theo chiều dọc thay vì chiều ngang như justify-content</a:t>
+            </a:r>
+            <a:r>
+              <a:rPr lang="vi-VN" dirty="0" smtClean="0"/>
+              <a:t>.</a:t>
+            </a:r>
+            <a:endParaRPr lang="en-US" dirty="0" smtClean="0"/>
+          </a:p>
+          <a:p>
+            <a:r>
+              <a:rPr lang="vi-VN" dirty="0"/>
+              <a:t>Mặc định trong align-items là </a:t>
+            </a:r>
+            <a:r>
+              <a:rPr lang="vi-VN" dirty="0" smtClean="0"/>
+              <a:t>stretch</a:t>
+            </a:r>
+            <a:r>
+              <a:rPr lang="en-US" dirty="0" smtClean="0"/>
+              <a:t> :</a:t>
+            </a:r>
+            <a:r>
+              <a:rPr lang="vi-VN" dirty="0" smtClean="0"/>
+              <a:t> </a:t>
+            </a:r>
+            <a:r>
+              <a:rPr lang="en-US" dirty="0" smtClean="0"/>
+              <a:t>N</a:t>
+            </a:r>
+            <a:r>
+              <a:rPr lang="vi-VN" dirty="0" smtClean="0"/>
+              <a:t>ếu </a:t>
+            </a:r>
+            <a:r>
+              <a:rPr lang="vi-VN" dirty="0"/>
+              <a:t>các phần tử các bạn set height: auto thì nó sẽ cao full hết container chứa nó, nhưng nếu các bạn set height cố định thì nó sẽ đè lên thuộc tính stretch này và tất nhiên nó sẽ không cao full mà chỉ lấy giá trị height mà bạn set.</a:t>
+            </a:r>
+            <a:endParaRPr lang="en-US" dirty="0"/>
+          </a:p>
+        </p:txBody>
+      </p:sp>
+    </p:spTree>
+    <p:extLst>
+      <p:ext uri="{BB962C8B-B14F-4D97-AF65-F5344CB8AC3E}">
+        <p14:creationId xmlns:p14="http://schemas.microsoft.com/office/powerpoint/2010/main" val="3048030800"/>
+      </p:ext>
+    </p:extLst>
+  </p:cSld>
+  <p:clrMapOvr>
+    <a:masterClrMapping/>
+  </p:clrMapOvr>
+</p:sld>
+</file>
+
+<file path=ppt/slides/slide25.xml><?xml version="1.0" encoding="utf-8"?>
+<p:sld xmlns:a="http://schemas.openxmlformats.org/drawingml/2006/main" xmlns:r="http://schemas.openxmlformats.org/officeDocument/2006/relationships" xmlns:p="http://schemas.openxmlformats.org/presentationml/2006/main">
+  <p:cSld>
+    <p:spTree>
+      <p:nvGrpSpPr>
+        <p:cNvPr id="1" name=""/>
+        <p:cNvGrpSpPr/>
+        <p:nvPr/>
+      </p:nvGrpSpPr>
+      <p:grpSpPr>
+        <a:xfrm>
+          <a:off x="0" y="0"/>
+          <a:ext cx="0" cy="0"/>
+          <a:chOff x="0" y="0"/>
+          <a:chExt cx="0" cy="0"/>
+        </a:xfrm>
+      </p:grpSpPr>
+      <p:sp>
+        <p:nvSpPr>
+          <p:cNvPr id="2" name="Title 1"/>
+          <p:cNvSpPr>
+            <a:spLocks noGrp="1"/>
+          </p:cNvSpPr>
+          <p:nvPr>
+            <p:ph type="title"/>
+          </p:nvPr>
+        </p:nvSpPr>
+        <p:spPr/>
+        <p:txBody>
+          <a:bodyPr/>
+          <a:lstStyle/>
+          <a:p>
+            <a:endParaRPr lang="en-US" dirty="0"/>
+          </a:p>
+        </p:txBody>
+      </p:sp>
+      <p:pic>
+        <p:nvPicPr>
+          <p:cNvPr id="6" name="Content Placeholder 5"/>
+          <p:cNvPicPr>
+            <a:picLocks noGrp="1" noChangeAspect="1"/>
+          </p:cNvPicPr>
+          <p:nvPr>
+            <p:ph idx="1"/>
+          </p:nvPr>
+        </p:nvPicPr>
+        <p:blipFill>
+          <a:blip r:embed="rId2">
+            <a:extLst>
+              <a:ext uri="{28A0092B-C50C-407E-A947-70E740481C1C}">
+                <a14:useLocalDpi xmlns:a14="http://schemas.microsoft.com/office/drawing/2010/main" val="0"/>
+              </a:ext>
+            </a:extLst>
+          </a:blip>
+          <a:stretch>
+            <a:fillRect/>
+          </a:stretch>
+        </p:blipFill>
+        <p:spPr>
+          <a:xfrm>
+            <a:off x="1333500" y="2001044"/>
+            <a:ext cx="9525000" cy="4000500"/>
+          </a:xfrm>
+        </p:spPr>
+      </p:pic>
+    </p:spTree>
+    <p:extLst>
+      <p:ext uri="{BB962C8B-B14F-4D97-AF65-F5344CB8AC3E}">
+        <p14:creationId xmlns:p14="http://schemas.microsoft.com/office/powerpoint/2010/main" val="3052846711"/>
+      </p:ext>
+    </p:extLst>
+  </p:cSld>
+  <p:clrMapOvr>
+    <a:masterClrMapping/>
+  </p:clrMapOvr>
+  <p:timing>
+    <p:tnLst>
+      <p:par>
+        <p:cTn id="1" dur="indefinite" restart="never" nodeType="tmRoot"/>
+      </p:par>
+    </p:tnLst>
+  </p:timing>
+</p:sld>
+</file>
+
+<file path=ppt/slides/slide26.xml><?xml version="1.0" encoding="utf-8"?>
+<p:sld xmlns:a="http://schemas.openxmlformats.org/drawingml/2006/main" xmlns:r="http://schemas.openxmlformats.org/officeDocument/2006/relationships" xmlns:p="http://schemas.openxmlformats.org/presentationml/2006/main">
+  <p:cSld>
+    <p:spTree>
+      <p:nvGrpSpPr>
+        <p:cNvPr id="1" name=""/>
+        <p:cNvGrpSpPr/>
+        <p:nvPr/>
+      </p:nvGrpSpPr>
+      <p:grpSpPr>
+        <a:xfrm>
+          <a:off x="0" y="0"/>
+          <a:ext cx="0" cy="0"/>
+          <a:chOff x="0" y="0"/>
+          <a:chExt cx="0" cy="0"/>
+        </a:xfrm>
+      </p:grpSpPr>
+      <p:sp>
+        <p:nvSpPr>
+          <p:cNvPr id="2" name="Title 1"/>
+          <p:cNvSpPr>
+            <a:spLocks noGrp="1"/>
+          </p:cNvSpPr>
+          <p:nvPr>
+            <p:ph type="title"/>
+          </p:nvPr>
+        </p:nvSpPr>
+        <p:spPr/>
+        <p:txBody>
+          <a:bodyPr/>
+          <a:lstStyle/>
+          <a:p>
+            <a:r>
+              <a:rPr lang="en-US" dirty="0" smtClean="0"/>
+              <a:t>#Align-self</a:t>
+            </a:r>
+            <a:endParaRPr lang="en-US" dirty="0"/>
+          </a:p>
+        </p:txBody>
+      </p:sp>
+      <p:sp>
+        <p:nvSpPr>
+          <p:cNvPr id="3" name="Content Placeholder 2"/>
+          <p:cNvSpPr>
+            <a:spLocks noGrp="1"/>
+          </p:cNvSpPr>
+          <p:nvPr>
+            <p:ph idx="1"/>
+          </p:nvPr>
+        </p:nvSpPr>
+        <p:spPr/>
+        <p:txBody>
+          <a:bodyPr/>
+          <a:lstStyle/>
+          <a:p>
+            <a:r>
+              <a:rPr lang="en-US" dirty="0" smtClean="0"/>
+              <a:t>Tưởng </a:t>
+            </a:r>
+            <a:r>
+              <a:rPr lang="en-US" dirty="0" err="1" smtClean="0"/>
+              <a:t>tự</a:t>
+            </a:r>
+            <a:r>
+              <a:rPr lang="en-US" dirty="0" smtClean="0"/>
+              <a:t> </a:t>
+            </a:r>
+            <a:r>
+              <a:rPr lang="en-US" dirty="0" err="1" smtClean="0"/>
+              <a:t>giống</a:t>
+            </a:r>
+            <a:r>
+              <a:rPr lang="en-US" dirty="0" smtClean="0"/>
+              <a:t> align item </a:t>
+            </a:r>
+            <a:r>
+              <a:rPr lang="en-US" dirty="0" err="1" smtClean="0"/>
+              <a:t>nhưng</a:t>
+            </a:r>
+            <a:r>
+              <a:rPr lang="en-US" dirty="0" smtClean="0"/>
+              <a:t> </a:t>
+            </a:r>
+            <a:r>
+              <a:rPr lang="en-US" dirty="0" err="1" smtClean="0"/>
+              <a:t>áp</a:t>
+            </a:r>
+            <a:r>
+              <a:rPr lang="en-US" dirty="0" smtClean="0"/>
+              <a:t> </a:t>
+            </a:r>
+            <a:r>
+              <a:rPr lang="en-US" dirty="0" err="1" smtClean="0"/>
+              <a:t>dụng</a:t>
+            </a:r>
+            <a:r>
+              <a:rPr lang="en-US" dirty="0" smtClean="0"/>
+              <a:t> </a:t>
+            </a:r>
+            <a:r>
+              <a:rPr lang="en-US" dirty="0" err="1" smtClean="0"/>
+              <a:t>cho</a:t>
+            </a:r>
+            <a:r>
+              <a:rPr lang="en-US" dirty="0" smtClean="0"/>
+              <a:t> </a:t>
+            </a:r>
+            <a:r>
+              <a:rPr lang="en-US" dirty="0" err="1" smtClean="0"/>
+              <a:t>từng</a:t>
+            </a:r>
+            <a:r>
+              <a:rPr lang="en-US" dirty="0" smtClean="0"/>
+              <a:t> item.</a:t>
+            </a:r>
+          </a:p>
+          <a:p>
+            <a:r>
+              <a:rPr lang="vi-VN" dirty="0"/>
+              <a:t>Giả sử bạn có các phần tử đều là align-items: flex-start(mặc định) nhưng bạn muốn thẻ div màu vàng ở giữa chứ không phải ở trên thì lúc này các bạn chỉ cần css cho thẻ div màu vàng align-self: center là được.</a:t>
+            </a:r>
+            <a:endParaRPr lang="en-US" dirty="0" smtClean="0"/>
+          </a:p>
+          <a:p>
+            <a:endParaRPr lang="en-US" dirty="0"/>
+          </a:p>
+        </p:txBody>
+      </p:sp>
+      <p:pic>
+        <p:nvPicPr>
+          <p:cNvPr id="5" name="Picture 4"/>
+          <p:cNvPicPr>
+            <a:picLocks noChangeAspect="1"/>
+          </p:cNvPicPr>
+          <p:nvPr/>
+        </p:nvPicPr>
+        <p:blipFill>
+          <a:blip r:embed="rId2"/>
+          <a:stretch>
+            <a:fillRect/>
+          </a:stretch>
+        </p:blipFill>
+        <p:spPr>
+          <a:xfrm>
+            <a:off x="2629621" y="4075185"/>
+            <a:ext cx="6581775" cy="2390270"/>
+          </a:xfrm>
+          <a:prstGeom prst="rect">
+            <a:avLst/>
+          </a:prstGeom>
+        </p:spPr>
+      </p:pic>
+    </p:spTree>
+    <p:extLst>
+      <p:ext uri="{BB962C8B-B14F-4D97-AF65-F5344CB8AC3E}">
+        <p14:creationId xmlns:p14="http://schemas.microsoft.com/office/powerpoint/2010/main" val="4114998157"/>
+      </p:ext>
+    </p:extLst>
+  </p:cSld>
+  <p:clrMapOvr>
+    <a:masterClrMapping/>
+  </p:clrMapOvr>
+</p:sld>
+</file>
+
+<file path=ppt/slides/slide27.xml><?xml version="1.0" encoding="utf-8"?>
+<p:sld xmlns:a="http://schemas.openxmlformats.org/drawingml/2006/main" xmlns:r="http://schemas.openxmlformats.org/officeDocument/2006/relationships" xmlns:p="http://schemas.openxmlformats.org/presentationml/2006/main">
+  <p:cSld>
+    <p:spTree>
+      <p:nvGrpSpPr>
+        <p:cNvPr id="1" name=""/>
+        <p:cNvGrpSpPr/>
+        <p:nvPr/>
+      </p:nvGrpSpPr>
+      <p:grpSpPr>
+        <a:xfrm>
+          <a:off x="0" y="0"/>
+          <a:ext cx="0" cy="0"/>
+          <a:chOff x="0" y="0"/>
+          <a:chExt cx="0" cy="0"/>
+        </a:xfrm>
+      </p:grpSpPr>
+      <p:sp>
+        <p:nvSpPr>
+          <p:cNvPr id="2" name="Title 1"/>
+          <p:cNvSpPr>
+            <a:spLocks noGrp="1"/>
+          </p:cNvSpPr>
+          <p:nvPr>
+            <p:ph type="title"/>
+          </p:nvPr>
+        </p:nvSpPr>
+        <p:spPr/>
+        <p:txBody>
+          <a:bodyPr/>
+          <a:lstStyle/>
+          <a:p>
+            <a:r>
+              <a:rPr lang="en-US" b="1" dirty="0"/>
+              <a:t># Flex-grow</a:t>
+            </a:r>
+            <a:br>
+              <a:rPr lang="en-US" b="1" dirty="0"/>
+            </a:br>
+            <a:endParaRPr lang="en-US" dirty="0"/>
+          </a:p>
+        </p:txBody>
+      </p:sp>
+      <p:sp>
+        <p:nvSpPr>
+          <p:cNvPr id="3" name="Content Placeholder 2"/>
+          <p:cNvSpPr>
+            <a:spLocks noGrp="1"/>
+          </p:cNvSpPr>
+          <p:nvPr>
+            <p:ph idx="1"/>
+          </p:nvPr>
+        </p:nvSpPr>
+        <p:spPr/>
+        <p:txBody>
+          <a:bodyPr/>
+          <a:lstStyle/>
+          <a:p>
+            <a:r>
+              <a:rPr lang="vi-VN" dirty="0"/>
+              <a:t>Mặc định giá trị trong thuộc tính flex-grow là 0</a:t>
+            </a:r>
+            <a:r>
+              <a:rPr lang="vi-VN" dirty="0" smtClean="0"/>
+              <a:t>.</a:t>
+            </a:r>
+            <a:endParaRPr lang="en-US" dirty="0" smtClean="0"/>
+          </a:p>
+          <a:p>
+            <a:r>
+              <a:rPr lang="en-US" dirty="0" err="1" smtClean="0"/>
+              <a:t>Giúp</a:t>
+            </a:r>
+            <a:r>
+              <a:rPr lang="en-US" dirty="0" smtClean="0"/>
+              <a:t> </a:t>
+            </a:r>
+            <a:r>
+              <a:rPr lang="vi-VN" dirty="0" smtClean="0"/>
+              <a:t>các </a:t>
+            </a:r>
+            <a:r>
+              <a:rPr lang="vi-VN" dirty="0"/>
+              <a:t>phần tử sẽ </a:t>
+            </a:r>
+            <a:r>
+              <a:rPr lang="vi-VN" dirty="0" smtClean="0"/>
+              <a:t>tự </a:t>
+            </a:r>
+            <a:r>
+              <a:rPr lang="vi-VN" dirty="0"/>
+              <a:t>động co giãn kích thước khi chiều rộng của container bao ngoài thay đổi.</a:t>
+            </a:r>
+            <a:endParaRPr lang="en-US" dirty="0"/>
+          </a:p>
+        </p:txBody>
+      </p:sp>
+    </p:spTree>
+    <p:extLst>
+      <p:ext uri="{BB962C8B-B14F-4D97-AF65-F5344CB8AC3E}">
+        <p14:creationId xmlns:p14="http://schemas.microsoft.com/office/powerpoint/2010/main" val="2320921593"/>
+      </p:ext>
+    </p:extLst>
+  </p:cSld>
+  <p:clrMapOvr>
+    <a:masterClrMapping/>
+  </p:clrMapOvr>
 </p:sld>
 </file>
 

</xml_diff>